<commit_message>
do something about ppt
</commit_message>
<xml_diff>
--- a/Python演示文稿.pptx
+++ b/Python演示文稿.pptx
@@ -488,6 +488,90 @@
 </file>
 
 <file path=ppt/notesSlides/notesSlide1.xml><?xml version="1.0" encoding="utf-8"?>
+<p:notes xmlns:a="http://schemas.openxmlformats.org/drawingml/2006/main" xmlns:r="http://schemas.openxmlformats.org/officeDocument/2006/relationships" xmlns:p="http://schemas.openxmlformats.org/presentationml/2006/main">
+  <p:cSld>
+    <p:spTree>
+      <p:nvGrpSpPr>
+        <p:cNvPr id="1" name=""/>
+        <p:cNvGrpSpPr/>
+        <p:nvPr/>
+      </p:nvGrpSpPr>
+      <p:grpSpPr>
+        <a:xfrm>
+          <a:off x="0" y="0"/>
+          <a:ext cx="0" cy="0"/>
+          <a:chOff x="0" y="0"/>
+          <a:chExt cx="0" cy="0"/>
+        </a:xfrm>
+      </p:grpSpPr>
+      <p:sp>
+        <p:nvSpPr>
+          <p:cNvPr id="2" name="幻灯片图像占位符 1"/>
+          <p:cNvSpPr>
+            <a:spLocks noGrp="1" noRot="1" noChangeAspect="1"/>
+          </p:cNvSpPr>
+          <p:nvPr>
+            <p:ph type="sldImg"/>
+          </p:nvPr>
+        </p:nvSpPr>
+        <p:spPr/>
+      </p:sp>
+      <p:sp>
+        <p:nvSpPr>
+          <p:cNvPr id="3" name="备注占位符 2"/>
+          <p:cNvSpPr>
+            <a:spLocks noGrp="1"/>
+          </p:cNvSpPr>
+          <p:nvPr>
+            <p:ph type="body" idx="1"/>
+          </p:nvPr>
+        </p:nvSpPr>
+        <p:spPr/>
+        <p:txBody>
+          <a:bodyPr/>
+          <a:lstStyle/>
+          <a:p>
+            <a:endParaRPr lang="zh-CN" altLang="en-US" dirty="0"/>
+          </a:p>
+        </p:txBody>
+      </p:sp>
+      <p:sp>
+        <p:nvSpPr>
+          <p:cNvPr id="4" name="灯片编号占位符 3"/>
+          <p:cNvSpPr>
+            <a:spLocks noGrp="1"/>
+          </p:cNvSpPr>
+          <p:nvPr>
+            <p:ph type="sldNum" sz="quarter" idx="5"/>
+          </p:nvPr>
+        </p:nvSpPr>
+        <p:spPr/>
+        <p:txBody>
+          <a:bodyPr/>
+          <a:lstStyle/>
+          <a:p>
+            <a:fld id="{51DEDAE4-02E5-4506-9832-0997B68A82B4}" type="slidenum">
+              <a:rPr lang="zh-CN" altLang="en-US" smtClean="0"/>
+              <a:t>5</a:t>
+            </a:fld>
+            <a:endParaRPr lang="zh-CN" altLang="en-US"/>
+          </a:p>
+        </p:txBody>
+      </p:sp>
+    </p:spTree>
+    <p:extLst>
+      <p:ext uri="{BB962C8B-B14F-4D97-AF65-F5344CB8AC3E}">
+        <p14:creationId xmlns:p14="http://schemas.microsoft.com/office/powerpoint/2010/main" val="4046703352"/>
+      </p:ext>
+    </p:extLst>
+  </p:cSld>
+  <p:clrMapOvr>
+    <a:masterClrMapping/>
+  </p:clrMapOvr>
+</p:notes>
+</file>
+
+<file path=ppt/notesSlides/notesSlide2.xml><?xml version="1.0" encoding="utf-8"?>
 <p:notes xmlns:a="http://schemas.openxmlformats.org/drawingml/2006/main" xmlns:r="http://schemas.openxmlformats.org/officeDocument/2006/relationships" xmlns:p="http://schemas.openxmlformats.org/presentationml/2006/main">
   <p:cSld>
     <p:spTree>
@@ -3859,6 +3943,18 @@
   <p:clrMapOvr>
     <a:masterClrMapping/>
   </p:clrMapOvr>
+  <mc:AlternateContent xmlns:mc="http://schemas.openxmlformats.org/markup-compatibility/2006">
+    <mc:Choice xmlns:p159="http://schemas.microsoft.com/office/powerpoint/2015/09/main" Requires="p159">
+      <p:transition spd="slow">
+        <p159:morph option="byObject"/>
+      </p:transition>
+    </mc:Choice>
+    <mc:Fallback>
+      <p:transition spd="slow">
+        <p:fade/>
+      </p:transition>
+    </mc:Fallback>
+  </mc:AlternateContent>
 </p:sld>
 </file>
 
@@ -4001,6 +4097,18 @@
   <p:clrMapOvr>
     <a:masterClrMapping/>
   </p:clrMapOvr>
+  <mc:AlternateContent xmlns:mc="http://schemas.openxmlformats.org/markup-compatibility/2006">
+    <mc:Choice xmlns:p159="http://schemas.microsoft.com/office/powerpoint/2015/09/main" Requires="p159">
+      <p:transition spd="slow">
+        <p159:morph option="byObject"/>
+      </p:transition>
+    </mc:Choice>
+    <mc:Fallback>
+      <p:transition spd="slow">
+        <p:fade/>
+      </p:transition>
+    </mc:Fallback>
+  </mc:AlternateContent>
 </p:sld>
 </file>
 
@@ -4165,6 +4273,18 @@
   <p:clrMapOvr>
     <a:masterClrMapping/>
   </p:clrMapOvr>
+  <mc:AlternateContent xmlns:mc="http://schemas.openxmlformats.org/markup-compatibility/2006">
+    <mc:Choice xmlns:p159="http://schemas.microsoft.com/office/powerpoint/2015/09/main" Requires="p159">
+      <p:transition spd="slow">
+        <p159:morph option="byObject"/>
+      </p:transition>
+    </mc:Choice>
+    <mc:Fallback>
+      <p:transition spd="slow">
+        <p:fade/>
+      </p:transition>
+    </mc:Fallback>
+  </mc:AlternateContent>
 </p:sld>
 </file>
 
@@ -4336,6 +4456,18 @@
   <p:clrMapOvr>
     <a:masterClrMapping/>
   </p:clrMapOvr>
+  <mc:AlternateContent xmlns:mc="http://schemas.openxmlformats.org/markup-compatibility/2006">
+    <mc:Choice xmlns:p159="http://schemas.microsoft.com/office/powerpoint/2015/09/main" Requires="p159">
+      <p:transition spd="slow">
+        <p159:morph option="byObject"/>
+      </p:transition>
+    </mc:Choice>
+    <mc:Fallback>
+      <p:transition spd="slow">
+        <p:fade/>
+      </p:transition>
+    </mc:Fallback>
+  </mc:AlternateContent>
 </p:sld>
 </file>
 
@@ -4564,6 +4696,18 @@
   <p:clrMapOvr>
     <a:masterClrMapping/>
   </p:clrMapOvr>
+  <mc:AlternateContent xmlns:mc="http://schemas.openxmlformats.org/markup-compatibility/2006">
+    <mc:Choice xmlns:p159="http://schemas.microsoft.com/office/powerpoint/2015/09/main" Requires="p159">
+      <p:transition spd="slow">
+        <p159:morph option="byObject"/>
+      </p:transition>
+    </mc:Choice>
+    <mc:Fallback>
+      <p:transition spd="slow">
+        <p:fade/>
+      </p:transition>
+    </mc:Fallback>
+  </mc:AlternateContent>
 </p:sld>
 </file>
 
@@ -4789,6 +4933,18 @@
   <p:clrMapOvr>
     <a:masterClrMapping/>
   </p:clrMapOvr>
+  <mc:AlternateContent xmlns:mc="http://schemas.openxmlformats.org/markup-compatibility/2006">
+    <mc:Choice xmlns:p159="http://schemas.microsoft.com/office/powerpoint/2015/09/main" Requires="p159">
+      <p:transition spd="slow">
+        <p159:morph option="byObject"/>
+      </p:transition>
+    </mc:Choice>
+    <mc:Fallback>
+      <p:transition spd="slow">
+        <p:fade/>
+      </p:transition>
+    </mc:Fallback>
+  </mc:AlternateContent>
 </p:sld>
 </file>
 
@@ -5001,6 +5157,18 @@
   <p:clrMapOvr>
     <a:masterClrMapping/>
   </p:clrMapOvr>
+  <mc:AlternateContent xmlns:mc="http://schemas.openxmlformats.org/markup-compatibility/2006">
+    <mc:Choice xmlns:p159="http://schemas.microsoft.com/office/powerpoint/2015/09/main" Requires="p159">
+      <p:transition spd="slow">
+        <p159:morph option="byObject"/>
+      </p:transition>
+    </mc:Choice>
+    <mc:Fallback>
+      <p:transition spd="slow">
+        <p:fade/>
+      </p:transition>
+    </mc:Fallback>
+  </mc:AlternateContent>
 </p:sld>
 </file>
 
@@ -5049,8 +5217,8 @@
           </a:p>
         </p:txBody>
       </p:sp>
-      <mc:AlternateContent xmlns:mc="http://schemas.openxmlformats.org/markup-compatibility/2006">
-        <mc:Choice xmlns:a14="http://schemas.microsoft.com/office/drawing/2010/main" Requires="a14">
+      <mc:AlternateContent xmlns:mc="http://schemas.openxmlformats.org/markup-compatibility/2006" xmlns:a14="http://schemas.microsoft.com/office/drawing/2010/main">
+        <mc:Choice Requires="a14">
           <p:sp>
             <p:nvSpPr>
               <p:cNvPr id="3" name="内容占位符 2">
@@ -5283,7 +5451,7 @@
             </p:txBody>
           </p:sp>
         </mc:Choice>
-        <mc:Fallback>
+        <mc:Fallback xmlns="">
           <p:sp>
             <p:nvSpPr>
               <p:cNvPr id="3" name="内容占位符 2">
@@ -5333,6 +5501,18 @@
   <p:clrMapOvr>
     <a:masterClrMapping/>
   </p:clrMapOvr>
+  <mc:AlternateContent xmlns:mc="http://schemas.openxmlformats.org/markup-compatibility/2006">
+    <mc:Choice xmlns:p159="http://schemas.microsoft.com/office/powerpoint/2015/09/main" Requires="p159">
+      <p:transition spd="slow">
+        <p159:morph option="byObject"/>
+      </p:transition>
+    </mc:Choice>
+    <mc:Fallback>
+      <p:transition spd="slow">
+        <p:fade/>
+      </p:transition>
+    </mc:Fallback>
+  </mc:AlternateContent>
 </p:sld>
 </file>
 
@@ -5440,6 +5620,18 @@
   <p:clrMapOvr>
     <a:masterClrMapping/>
   </p:clrMapOvr>
+  <mc:AlternateContent xmlns:mc="http://schemas.openxmlformats.org/markup-compatibility/2006">
+    <mc:Choice xmlns:p159="http://schemas.microsoft.com/office/powerpoint/2015/09/main" Requires="p159">
+      <p:transition spd="slow">
+        <p159:morph option="byObject"/>
+      </p:transition>
+    </mc:Choice>
+    <mc:Fallback>
+      <p:transition spd="slow">
+        <p:fade/>
+      </p:transition>
+    </mc:Fallback>
+  </mc:AlternateContent>
 </p:sld>
 </file>
 
@@ -5724,6 +5916,18 @@
   <p:clrMapOvr>
     <a:masterClrMapping/>
   </p:clrMapOvr>
+  <mc:AlternateContent xmlns:mc="http://schemas.openxmlformats.org/markup-compatibility/2006">
+    <mc:Choice xmlns:p159="http://schemas.microsoft.com/office/powerpoint/2015/09/main" Requires="p159">
+      <p:transition spd="slow">
+        <p159:morph option="byObject"/>
+      </p:transition>
+    </mc:Choice>
+    <mc:Fallback>
+      <p:transition spd="slow">
+        <p:fade/>
+      </p:transition>
+    </mc:Fallback>
+  </mc:AlternateContent>
 </p:sld>
 </file>
 
@@ -5811,6 +6015,18 @@
   <p:clrMapOvr>
     <a:masterClrMapping/>
   </p:clrMapOvr>
+  <mc:AlternateContent xmlns:mc="http://schemas.openxmlformats.org/markup-compatibility/2006">
+    <mc:Choice xmlns:p159="http://schemas.microsoft.com/office/powerpoint/2015/09/main" Requires="p159">
+      <p:transition spd="slow">
+        <p159:morph option="byObject"/>
+      </p:transition>
+    </mc:Choice>
+    <mc:Fallback>
+      <p:transition spd="slow">
+        <p:fade/>
+      </p:transition>
+    </mc:Fallback>
+  </mc:AlternateContent>
 </p:sld>
 </file>
 
@@ -5898,6 +6114,18 @@
   <p:clrMapOvr>
     <a:masterClrMapping/>
   </p:clrMapOvr>
+  <mc:AlternateContent xmlns:mc="http://schemas.openxmlformats.org/markup-compatibility/2006">
+    <mc:Choice xmlns:p159="http://schemas.microsoft.com/office/powerpoint/2015/09/main" Requires="p159">
+      <p:transition spd="slow">
+        <p159:morph option="byObject"/>
+      </p:transition>
+    </mc:Choice>
+    <mc:Fallback>
+      <p:transition spd="slow">
+        <p:fade/>
+      </p:transition>
+    </mc:Fallback>
+  </mc:AlternateContent>
 </p:sld>
 </file>
 
@@ -6045,6 +6273,18 @@
   <p:clrMapOvr>
     <a:masterClrMapping/>
   </p:clrMapOvr>
+  <mc:AlternateContent xmlns:mc="http://schemas.openxmlformats.org/markup-compatibility/2006">
+    <mc:Choice xmlns:p159="http://schemas.microsoft.com/office/powerpoint/2015/09/main" Requires="p159">
+      <p:transition spd="slow">
+        <p159:morph option="byObject"/>
+      </p:transition>
+    </mc:Choice>
+    <mc:Fallback>
+      <p:transition spd="slow">
+        <p:fade/>
+      </p:transition>
+    </mc:Fallback>
+  </mc:AlternateContent>
 </p:sld>
 </file>
 
@@ -6239,6 +6479,18 @@
   <p:clrMapOvr>
     <a:masterClrMapping/>
   </p:clrMapOvr>
+  <mc:AlternateContent xmlns:mc="http://schemas.openxmlformats.org/markup-compatibility/2006">
+    <mc:Choice xmlns:p159="http://schemas.microsoft.com/office/powerpoint/2015/09/main" Requires="p159">
+      <p:transition spd="slow">
+        <p159:morph option="byObject"/>
+      </p:transition>
+    </mc:Choice>
+    <mc:Fallback>
+      <p:transition spd="slow">
+        <p:fade/>
+      </p:transition>
+    </mc:Fallback>
+  </mc:AlternateContent>
   <p:timing>
     <p:tnLst>
       <p:par>
@@ -6462,6 +6714,18 @@
   <p:clrMapOvr>
     <a:masterClrMapping/>
   </p:clrMapOvr>
+  <mc:AlternateContent xmlns:mc="http://schemas.openxmlformats.org/markup-compatibility/2006">
+    <mc:Choice xmlns:p159="http://schemas.microsoft.com/office/powerpoint/2015/09/main" Requires="p159">
+      <p:transition spd="slow">
+        <p159:morph option="byObject"/>
+      </p:transition>
+    </mc:Choice>
+    <mc:Fallback>
+      <p:transition spd="slow">
+        <p:fade/>
+      </p:transition>
+    </mc:Fallback>
+  </mc:AlternateContent>
 </p:sld>
 </file>
 
@@ -6573,6 +6837,18 @@
   <p:clrMapOvr>
     <a:masterClrMapping/>
   </p:clrMapOvr>
+  <mc:AlternateContent xmlns:mc="http://schemas.openxmlformats.org/markup-compatibility/2006">
+    <mc:Choice xmlns:p159="http://schemas.microsoft.com/office/powerpoint/2015/09/main" Requires="p159">
+      <p:transition spd="slow">
+        <p159:morph option="byObject"/>
+      </p:transition>
+    </mc:Choice>
+    <mc:Fallback>
+      <p:transition spd="slow">
+        <p:fade/>
+      </p:transition>
+    </mc:Fallback>
+  </mc:AlternateContent>
 </p:sld>
 </file>
 
@@ -6724,6 +7000,18 @@
   <p:clrMapOvr>
     <a:masterClrMapping/>
   </p:clrMapOvr>
+  <mc:AlternateContent xmlns:mc="http://schemas.openxmlformats.org/markup-compatibility/2006">
+    <mc:Choice xmlns:p159="http://schemas.microsoft.com/office/powerpoint/2015/09/main" Requires="p159">
+      <p:transition spd="slow">
+        <p159:morph option="byObject"/>
+      </p:transition>
+    </mc:Choice>
+    <mc:Fallback>
+      <p:transition spd="slow">
+        <p:fade/>
+      </p:transition>
+    </mc:Fallback>
+  </mc:AlternateContent>
 </p:sld>
 </file>
 
@@ -6888,6 +7176,18 @@
   <p:clrMapOvr>
     <a:masterClrMapping/>
   </p:clrMapOvr>
+  <mc:AlternateContent xmlns:mc="http://schemas.openxmlformats.org/markup-compatibility/2006">
+    <mc:Choice xmlns:p159="http://schemas.microsoft.com/office/powerpoint/2015/09/main" Requires="p159">
+      <p:transition spd="slow">
+        <p159:morph option="byObject"/>
+      </p:transition>
+    </mc:Choice>
+    <mc:Fallback>
+      <p:transition spd="slow">
+        <p:fade/>
+      </p:transition>
+    </mc:Fallback>
+  </mc:AlternateContent>
 </p:sld>
 </file>
 
@@ -7348,6 +7648,18 @@
   <p:clrMapOvr>
     <a:masterClrMapping/>
   </p:clrMapOvr>
+  <mc:AlternateContent xmlns:mc="http://schemas.openxmlformats.org/markup-compatibility/2006">
+    <mc:Choice xmlns:p159="http://schemas.microsoft.com/office/powerpoint/2015/09/main" Requires="p159">
+      <p:transition spd="slow">
+        <p159:morph option="byObject"/>
+      </p:transition>
+    </mc:Choice>
+    <mc:Fallback>
+      <p:transition spd="slow">
+        <p:fade/>
+      </p:transition>
+    </mc:Fallback>
+  </mc:AlternateContent>
 </p:sld>
 </file>
 
@@ -7463,6 +7775,18 @@
   <p:clrMapOvr>
     <a:masterClrMapping/>
   </p:clrMapOvr>
+  <mc:AlternateContent xmlns:mc="http://schemas.openxmlformats.org/markup-compatibility/2006">
+    <mc:Choice xmlns:p159="http://schemas.microsoft.com/office/powerpoint/2015/09/main" Requires="p159">
+      <p:transition spd="slow">
+        <p159:morph option="byObject"/>
+      </p:transition>
+    </mc:Choice>
+    <mc:Fallback>
+      <p:transition spd="slow">
+        <p:fade/>
+      </p:transition>
+    </mc:Fallback>
+  </mc:AlternateContent>
 </p:sld>
 </file>
 
@@ -7637,6 +7961,18 @@
   <p:clrMapOvr>
     <a:masterClrMapping/>
   </p:clrMapOvr>
+  <mc:AlternateContent xmlns:mc="http://schemas.openxmlformats.org/markup-compatibility/2006">
+    <mc:Choice xmlns:p159="http://schemas.microsoft.com/office/powerpoint/2015/09/main" Requires="p159">
+      <p:transition spd="slow">
+        <p159:morph option="byObject"/>
+      </p:transition>
+    </mc:Choice>
+    <mc:Fallback>
+      <p:transition spd="slow">
+        <p:fade/>
+      </p:transition>
+    </mc:Fallback>
+  </mc:AlternateContent>
 </p:sld>
 </file>
 
@@ -7723,6 +8059,18 @@
   <p:clrMapOvr>
     <a:masterClrMapping/>
   </p:clrMapOvr>
+  <mc:AlternateContent xmlns:mc="http://schemas.openxmlformats.org/markup-compatibility/2006">
+    <mc:Choice xmlns:p159="http://schemas.microsoft.com/office/powerpoint/2015/09/main" Requires="p159">
+      <p:transition spd="slow">
+        <p159:morph option="byObject"/>
+      </p:transition>
+    </mc:Choice>
+    <mc:Fallback>
+      <p:transition spd="slow">
+        <p:fade/>
+      </p:transition>
+    </mc:Fallback>
+  </mc:AlternateContent>
 </p:sld>
 </file>
 
@@ -7809,6 +8157,18 @@
   <p:clrMapOvr>
     <a:masterClrMapping/>
   </p:clrMapOvr>
+  <mc:AlternateContent xmlns:mc="http://schemas.openxmlformats.org/markup-compatibility/2006">
+    <mc:Choice xmlns:p159="http://schemas.microsoft.com/office/powerpoint/2015/09/main" Requires="p159">
+      <p:transition spd="slow">
+        <p159:morph option="byObject"/>
+      </p:transition>
+    </mc:Choice>
+    <mc:Fallback>
+      <p:transition spd="slow">
+        <p:fade/>
+      </p:transition>
+    </mc:Fallback>
+  </mc:AlternateContent>
 </p:sld>
 </file>
 
@@ -7896,6 +8256,18 @@
   <p:clrMapOvr>
     <a:masterClrMapping/>
   </p:clrMapOvr>
+  <mc:AlternateContent xmlns:mc="http://schemas.openxmlformats.org/markup-compatibility/2006">
+    <mc:Choice xmlns:p159="http://schemas.microsoft.com/office/powerpoint/2015/09/main" Requires="p159">
+      <p:transition spd="slow">
+        <p159:morph option="byObject"/>
+      </p:transition>
+    </mc:Choice>
+    <mc:Fallback>
+      <p:transition spd="slow">
+        <p:fade/>
+      </p:transition>
+    </mc:Fallback>
+  </mc:AlternateContent>
 </p:sld>
 </file>
 

</xml_diff>